<commit_message>
completed week 5 walk throughs.
</commit_message>
<xml_diff>
--- a/student-presentation/Numeric and Associative Arrays.pptx
+++ b/student-presentation/Numeric and Associative Arrays.pptx
@@ -6,10 +6,10 @@
   </p:sldMasterIdLst>
   <p:sldIdLst>
     <p:sldId id="256" r:id="rId2"/>
-    <p:sldId id="257" r:id="rId3"/>
-    <p:sldId id="259" r:id="rId4"/>
-    <p:sldId id="260" r:id="rId5"/>
-    <p:sldId id="261" r:id="rId6"/>
+    <p:sldId id="259" r:id="rId3"/>
+    <p:sldId id="260" r:id="rId4"/>
+    <p:sldId id="261" r:id="rId5"/>
+    <p:sldId id="257" r:id="rId6"/>
     <p:sldId id="258" r:id="rId7"/>
     <p:sldId id="262" r:id="rId8"/>
   </p:sldIdLst>
@@ -5455,7 +5455,7 @@
           <a:p>
             <a:r>
               <a:rPr lang="en-US" dirty="0"/>
-              <a:t>Three kinds of arrays in PHP</a:t>
+              <a:t>What’s an array and how can I use it?</a:t>
             </a:r>
           </a:p>
         </p:txBody>
@@ -5483,28 +5483,7 @@
           <a:p>
             <a:r>
               <a:rPr lang="en-US" dirty="0"/>
-              <a:t>Numeric</a:t>
-            </a:r>
-          </a:p>
-          <a:p>
-            <a:r>
-              <a:rPr lang="en-US" dirty="0"/>
-              <a:t>Associative</a:t>
-            </a:r>
-          </a:p>
-          <a:p>
-            <a:r>
-              <a:rPr lang="en-US" dirty="0"/>
-              <a:t>Multidimensional *</a:t>
-            </a:r>
-          </a:p>
-          <a:p>
-            <a:pPr marL="0" indent="0">
-              <a:buNone/>
-            </a:pPr>
-            <a:r>
-              <a:rPr lang="en-US" sz="1400" dirty="0"/>
-              <a:t>	* today we’ll only be talking about Numeric and Associative</a:t>
+              <a:t>An array allows you to store several different values in one variable rather than creating a variable to store each value by itself. </a:t>
             </a:r>
           </a:p>
         </p:txBody>
@@ -5512,7 +5491,7 @@
     </p:spTree>
     <p:extLst>
       <p:ext uri="{BB962C8B-B14F-4D97-AF65-F5344CB8AC3E}">
-        <p14:creationId xmlns:p14="http://schemas.microsoft.com/office/powerpoint/2010/main" val="668931918"/>
+        <p14:creationId xmlns:p14="http://schemas.microsoft.com/office/powerpoint/2010/main" val="2799899901"/>
       </p:ext>
     </p:extLst>
   </p:cSld>
@@ -5562,7 +5541,7 @@
           <a:p>
             <a:r>
               <a:rPr lang="en-US" dirty="0"/>
-              <a:t>What’s an array and how can I use it?</a:t>
+              <a:t>For example…</a:t>
             </a:r>
           </a:p>
         </p:txBody>
@@ -5590,15 +5569,62 @@
           <a:p>
             <a:r>
               <a:rPr lang="en-US" dirty="0"/>
-              <a:t>An array allows you to store several different values in one variable rather than creating a variable to store each value by itself. </a:t>
-            </a:r>
+              <a:t>Let’s say I wanted to build a program that replies automatically to a message</a:t>
+            </a:r>
+          </a:p>
+          <a:p>
+            <a:r>
+              <a:rPr lang="en-US" dirty="0"/>
+              <a:t>I could create a variable for each phrase </a:t>
+            </a:r>
+          </a:p>
+          <a:p>
+            <a:pPr lvl="1"/>
+            <a:r>
+              <a:rPr lang="en-US" dirty="0"/>
+              <a:t>$response1 = “on my way”</a:t>
+            </a:r>
+          </a:p>
+          <a:p>
+            <a:pPr lvl="1"/>
+            <a:r>
+              <a:rPr lang="en-US" dirty="0"/>
+              <a:t>$response2 = “new phone, who dis?”</a:t>
+            </a:r>
+          </a:p>
+          <a:p>
+            <a:pPr lvl="1"/>
+            <a:r>
+              <a:rPr lang="en-US" dirty="0"/>
+              <a:t>$response3 = “sorry driving…”</a:t>
+            </a:r>
+          </a:p>
+          <a:p>
+            <a:pPr lvl="1"/>
+            <a:r>
+              <a:rPr lang="en-US" dirty="0"/>
+              <a:t>echo $response1 </a:t>
+            </a:r>
+          </a:p>
+          <a:p>
+            <a:pPr lvl="2"/>
+            <a:r>
+              <a:rPr lang="en-US" i="1" dirty="0"/>
+              <a:t>(displays “on my way”)</a:t>
+            </a:r>
+          </a:p>
+          <a:p>
+            <a:pPr marL="457200" lvl="1" indent="0">
+              <a:buNone/>
+            </a:pPr>
+            <a:endParaRPr lang="en-US" dirty="0"/>
           </a:p>
         </p:txBody>
       </p:sp>
     </p:spTree>
     <p:extLst>
       <p:ext uri="{BB962C8B-B14F-4D97-AF65-F5344CB8AC3E}">
-        <p14:creationId xmlns:p14="http://schemas.microsoft.com/office/powerpoint/2010/main" val="2799899901"/>
+        <p14:creationId xmlns:p14="http://schemas.microsoft.com/office/powerpoint/2010/main" val="649176608"/>
       </p:ext>
     </p:extLst>
   </p:cSld>
@@ -5676,62 +5702,94 @@
           <a:p>
             <a:r>
               <a:rPr lang="en-US" dirty="0"/>
-              <a:t>Let’s say I wanted to build a program that replies automatically to a message</a:t>
-            </a:r>
-          </a:p>
-          <a:p>
+              <a:t>Or I could use an array to store all my responses together</a:t>
+            </a:r>
+          </a:p>
+          <a:p>
+            <a:pPr lvl="1"/>
             <a:r>
               <a:rPr lang="en-US" dirty="0"/>
-              <a:t>I could create a variable for each phrase </a:t>
+              <a:t>$responses = array(“on my way”, “new phone who dis?”, “sorry driving…”);</a:t>
             </a:r>
           </a:p>
           <a:p>
             <a:pPr lvl="1"/>
             <a:r>
               <a:rPr lang="en-US" dirty="0"/>
-              <a:t>$response1 = “on my way”</a:t>
+              <a:t>echo $responses[0] </a:t>
+            </a:r>
+          </a:p>
+          <a:p>
+            <a:pPr lvl="2"/>
+            <a:r>
+              <a:rPr lang="en-US" i="1" dirty="0"/>
+              <a:t>(displays ”on my way”)</a:t>
+            </a:r>
+          </a:p>
+          <a:p>
+            <a:r>
+              <a:rPr lang="en-US" dirty="0"/>
+              <a:t>The use of an array here could also make it easy to randomly select one of the phrases</a:t>
             </a:r>
           </a:p>
           <a:p>
             <a:pPr lvl="1"/>
             <a:r>
               <a:rPr lang="en-US" dirty="0"/>
-              <a:t>$response2 = “new phone, who dis?”</a:t>
+              <a:t>$responses = array("this is it", "on my way", "another one");</a:t>
             </a:r>
           </a:p>
           <a:p>
             <a:pPr lvl="1"/>
             <a:r>
               <a:rPr lang="en-US" dirty="0"/>
-              <a:t>$response3 = “sorry driving…”</a:t>
+              <a:t>$</a:t>
+            </a:r>
+            <a:r>
+              <a:rPr lang="en-US" dirty="0" err="1"/>
+              <a:t>random_index</a:t>
+            </a:r>
+            <a:r>
+              <a:rPr lang="en-US" dirty="0"/>
+              <a:t> = </a:t>
+            </a:r>
+            <a:r>
+              <a:rPr lang="en-US" dirty="0" err="1"/>
+              <a:t>array_rand</a:t>
+            </a:r>
+            <a:r>
+              <a:rPr lang="en-US" dirty="0"/>
+              <a:t>($responses);</a:t>
             </a:r>
           </a:p>
           <a:p>
             <a:pPr lvl="1"/>
             <a:r>
               <a:rPr lang="en-US" dirty="0"/>
-              <a:t>echo $response1 </a:t>
+              <a:t>echo $responses[$</a:t>
+            </a:r>
+            <a:r>
+              <a:rPr lang="en-US" dirty="0" err="1"/>
+              <a:t>random_index</a:t>
+            </a:r>
+            <a:r>
+              <a:rPr lang="en-US" dirty="0"/>
+              <a:t>]; </a:t>
             </a:r>
           </a:p>
           <a:p>
             <a:pPr lvl="2"/>
             <a:r>
               <a:rPr lang="en-US" i="1" dirty="0"/>
-              <a:t>(displays “on my way”)</a:t>
-            </a:r>
-          </a:p>
-          <a:p>
-            <a:pPr marL="457200" lvl="1" indent="0">
-              <a:buNone/>
-            </a:pPr>
-            <a:endParaRPr lang="en-US" dirty="0"/>
+              <a:t>(randomly picks one of the phrases to display)</a:t>
+            </a:r>
           </a:p>
         </p:txBody>
       </p:sp>
     </p:spTree>
     <p:extLst>
       <p:ext uri="{BB962C8B-B14F-4D97-AF65-F5344CB8AC3E}">
-        <p14:creationId xmlns:p14="http://schemas.microsoft.com/office/powerpoint/2010/main" val="649176608"/>
+        <p14:creationId xmlns:p14="http://schemas.microsoft.com/office/powerpoint/2010/main" val="2766706337"/>
       </p:ext>
     </p:extLst>
   </p:cSld>
@@ -5781,7 +5839,7 @@
           <a:p>
             <a:r>
               <a:rPr lang="en-US" dirty="0"/>
-              <a:t>For example…</a:t>
+              <a:t>Three kinds of arrays in PHP</a:t>
             </a:r>
           </a:p>
         </p:txBody>
@@ -5809,86 +5867,28 @@
           <a:p>
             <a:r>
               <a:rPr lang="en-US" dirty="0"/>
-              <a:t>Or I could use an array to store all my responses together</a:t>
-            </a:r>
-          </a:p>
-          <a:p>
-            <a:pPr lvl="1"/>
+              <a:t>Numeric</a:t>
+            </a:r>
+          </a:p>
+          <a:p>
             <a:r>
               <a:rPr lang="en-US" dirty="0"/>
-              <a:t>$responses = array(“on my way”, “new phone who dis?”, “sorry driving…”);</a:t>
-            </a:r>
-          </a:p>
-          <a:p>
-            <a:pPr lvl="1"/>
+              <a:t>Associative</a:t>
+            </a:r>
+          </a:p>
+          <a:p>
             <a:r>
               <a:rPr lang="en-US" dirty="0"/>
-              <a:t>echo $responses[0] </a:t>
-            </a:r>
-          </a:p>
-          <a:p>
-            <a:pPr lvl="2"/>
-            <a:r>
-              <a:rPr lang="en-US" i="1" dirty="0"/>
-              <a:t>(displays ”on my way”)</a:t>
-            </a:r>
-          </a:p>
-          <a:p>
-            <a:r>
-              <a:rPr lang="en-US" dirty="0"/>
-              <a:t>The use of an array here could also make it easy to randomly select one of the phrases</a:t>
-            </a:r>
-          </a:p>
-          <a:p>
-            <a:pPr lvl="1"/>
-            <a:r>
-              <a:rPr lang="en-US" dirty="0"/>
-              <a:t>$responses = array("this is it", "on my way", "another one");</a:t>
-            </a:r>
-          </a:p>
-          <a:p>
-            <a:pPr lvl="1"/>
-            <a:r>
-              <a:rPr lang="en-US" dirty="0"/>
-              <a:t>$</a:t>
-            </a:r>
-            <a:r>
-              <a:rPr lang="en-US" dirty="0" err="1"/>
-              <a:t>random_index</a:t>
-            </a:r>
-            <a:r>
-              <a:rPr lang="en-US" dirty="0"/>
-              <a:t> = </a:t>
-            </a:r>
-            <a:r>
-              <a:rPr lang="en-US" dirty="0" err="1"/>
-              <a:t>array_rand</a:t>
-            </a:r>
-            <a:r>
-              <a:rPr lang="en-US" dirty="0"/>
-              <a:t>($responses);</a:t>
-            </a:r>
-          </a:p>
-          <a:p>
-            <a:pPr lvl="1"/>
-            <a:r>
-              <a:rPr lang="en-US" dirty="0"/>
-              <a:t>echo $responses[$</a:t>
-            </a:r>
-            <a:r>
-              <a:rPr lang="en-US" dirty="0" err="1"/>
-              <a:t>random_index</a:t>
-            </a:r>
-            <a:r>
-              <a:rPr lang="en-US" dirty="0"/>
-              <a:t>]; </a:t>
-            </a:r>
-          </a:p>
-          <a:p>
-            <a:pPr lvl="2"/>
-            <a:r>
-              <a:rPr lang="en-US" i="1" dirty="0"/>
-              <a:t>(randomly picks one of the phrases to display)</a:t>
+              <a:t>Multidimensional *</a:t>
+            </a:r>
+          </a:p>
+          <a:p>
+            <a:pPr marL="0" indent="0">
+              <a:buNone/>
+            </a:pPr>
+            <a:r>
+              <a:rPr lang="en-US" sz="1400" dirty="0"/>
+              <a:t>	* today we’ll only be talking about Numeric and Associative</a:t>
             </a:r>
           </a:p>
         </p:txBody>
@@ -5896,7 +5896,7 @@
     </p:spTree>
     <p:extLst>
       <p:ext uri="{BB962C8B-B14F-4D97-AF65-F5344CB8AC3E}">
-        <p14:creationId xmlns:p14="http://schemas.microsoft.com/office/powerpoint/2010/main" val="2766706337"/>
+        <p14:creationId xmlns:p14="http://schemas.microsoft.com/office/powerpoint/2010/main" val="668931918"/>
       </p:ext>
     </p:extLst>
   </p:cSld>

</xml_diff>